<commit_message>
Adding info for ADAMS geometries
</commit_message>
<xml_diff>
--- a/ADAMS/PISA_IIT_SOFT_HAND_TEMPLATE/scripts_and_useful_info/Geometry_info.pptx
+++ b/ADAMS/PISA_IIT_SOFT_HAND_TEMPLATE/scripts_and_useful_info/Geometry_info.pptx
@@ -3447,15 +3447,23 @@
             </a:r>
             <a:r>
               <a:rPr lang="en-US" dirty="0" smtClean="0"/>
-              <a:t>hen you must substitute the old geometries and import the PISAIIT_HAND.cmd in </a:t>
-            </a:r>
-            <a:r>
-              <a:rPr lang="en-US" dirty="0" err="1" smtClean="0"/>
-              <a:t>adams</a:t>
+              <a:t>hen you must substitute the old </a:t>
             </a:r>
             <a:r>
               <a:rPr lang="en-US" dirty="0" smtClean="0"/>
-              <a:t> to generate the .bin file.</a:t>
+              <a:t>geometry files </a:t>
+            </a:r>
+            <a:r>
+              <a:rPr lang="en-US" dirty="0" smtClean="0"/>
+              <a:t>and import the PISAIIT_HAND.cmd </a:t>
+            </a:r>
+            <a:r>
+              <a:rPr lang="en-US" smtClean="0"/>
+              <a:t>in ADAMS to </a:t>
+            </a:r>
+            <a:r>
+              <a:rPr lang="en-US" dirty="0" smtClean="0"/>
+              <a:t>generate the .bin file.</a:t>
             </a:r>
             <a:endParaRPr lang="en-US" dirty="0"/>
           </a:p>

</xml_diff>